<commit_message>
Cutdown on text for poster
</commit_message>
<xml_diff>
--- a/Abstract and Poster/CSP Poster FINAL 20FEB2024.pptx
+++ b/Abstract and Poster/CSP Poster FINAL 20FEB2024.pptx
@@ -257,7 +257,7 @@
       </p15:sldGuideLst>
     </p:ext>
     <p:ext uri="GoogleSlidesCustomDataVersion2">
-      <go:slidesCustomData xmlns:go="http://customooxmlschemas.google.com/" r:id="rId7" roundtripDataSignature="AMtx7mjOGJqBt56XUzBPaVtRBNMIBG68xQ=="/>
+      <go:slidesCustomData xmlns:go="http://customooxmlschemas.google.com/" r:id="rId7" roundtripDataSignature="AMtx7miFbDsA9KExIWpAZ+2wiIhu7UX0FQ=="/>
     </p:ext>
   </p:extLst>
 </p:presentation>
@@ -12015,7 +12015,7 @@
         <p:spPr>
           <a:xfrm>
             <a:off x="8505567" y="2767307"/>
-            <a:ext cx="8001000" cy="15565437"/>
+            <a:ext cx="8001000" cy="15565500"/>
           </a:xfrm>
           <a:prstGeom prst="roundRect">
             <a:avLst>
@@ -12510,45 +12510,9 @@
               <a:buNone/>
             </a:pPr>
             <a:r>
-              <a:rPr b="0" i="0" lang="en-US" sz="3100" u="none" cap="none" strike="noStrike">
-                <a:solidFill>
-                  <a:schemeClr val="dk1"/>
-                </a:solidFill>
-                <a:latin typeface="Calibri"/>
-                <a:ea typeface="Calibri"/>
-                <a:cs typeface="Calibri"/>
-                <a:sym typeface="Calibri"/>
-              </a:rPr>
-              <a:t>Defining a </a:t>
-            </a:r>
-            <a:r>
-              <a:rPr b="1" i="0" lang="en-US" sz="3100" u="sng" cap="none" strike="noStrike">
-                <a:solidFill>
-                  <a:schemeClr val="dk1"/>
-                </a:solidFill>
-                <a:latin typeface="Calibri"/>
-                <a:ea typeface="Calibri"/>
-                <a:cs typeface="Calibri"/>
-                <a:sym typeface="Calibri"/>
-              </a:rPr>
-              <a:t>consensus statement:</a:t>
-            </a:r>
-            <a:endParaRPr sz="3100"/>
-          </a:p>
-          <a:p>
-            <a:pPr indent="0" lvl="0" marL="0" marR="0" rtl="0" algn="l">
-              <a:spcBef>
-                <a:spcPts val="0"/>
-              </a:spcBef>
-              <a:spcAft>
-                <a:spcPts val="0"/>
-              </a:spcAft>
-              <a:buNone/>
-            </a:pPr>
-            <a:r>
               <a:t/>
             </a:r>
-            <a:endParaRPr b="0" i="0" sz="900" u="none" cap="none" strike="noStrike">
+            <a:endParaRPr sz="3100">
               <a:solidFill>
                 <a:schemeClr val="dk1"/>
               </a:solidFill>
@@ -12569,6 +12533,65 @@
               <a:buNone/>
             </a:pPr>
             <a:r>
+              <a:rPr b="0" i="0" lang="en-US" sz="3100" u="none" cap="none" strike="noStrike">
+                <a:solidFill>
+                  <a:schemeClr val="dk1"/>
+                </a:solidFill>
+                <a:latin typeface="Calibri"/>
+                <a:ea typeface="Calibri"/>
+                <a:cs typeface="Calibri"/>
+                <a:sym typeface="Calibri"/>
+              </a:rPr>
+              <a:t>Defining a </a:t>
+            </a:r>
+            <a:r>
+              <a:rPr b="1" i="0" lang="en-US" sz="3100" u="sng" cap="none" strike="noStrike">
+                <a:solidFill>
+                  <a:schemeClr val="dk1"/>
+                </a:solidFill>
+                <a:latin typeface="Calibri"/>
+                <a:ea typeface="Calibri"/>
+                <a:cs typeface="Calibri"/>
+                <a:sym typeface="Calibri"/>
+              </a:rPr>
+              <a:t>consensus statement:</a:t>
+            </a:r>
+            <a:endParaRPr sz="3100"/>
+          </a:p>
+          <a:p>
+            <a:pPr indent="0" lvl="0" marL="0" marR="0" rtl="0" algn="l">
+              <a:spcBef>
+                <a:spcPts val="0"/>
+              </a:spcBef>
+              <a:spcAft>
+                <a:spcPts val="0"/>
+              </a:spcAft>
+              <a:buNone/>
+            </a:pPr>
+            <a:r>
+              <a:t/>
+            </a:r>
+            <a:endParaRPr sz="900">
+              <a:solidFill>
+                <a:schemeClr val="dk1"/>
+              </a:solidFill>
+              <a:latin typeface="Calibri"/>
+              <a:ea typeface="Calibri"/>
+              <a:cs typeface="Calibri"/>
+              <a:sym typeface="Calibri"/>
+            </a:endParaRPr>
+          </a:p>
+          <a:p>
+            <a:pPr indent="0" lvl="0" marL="0" marR="0" rtl="0" algn="l">
+              <a:spcBef>
+                <a:spcPts val="0"/>
+              </a:spcBef>
+              <a:spcAft>
+                <a:spcPts val="0"/>
+              </a:spcAft>
+              <a:buNone/>
+            </a:pPr>
+            <a:r>
               <a:rPr b="0" i="1" lang="en-US" sz="3100" u="none" cap="none" strike="noStrike">
                 <a:solidFill>
                   <a:schemeClr val="dk1"/>
@@ -12614,7 +12637,7 @@
                 <a:cs typeface="Calibri"/>
                 <a:sym typeface="Calibri"/>
               </a:rPr>
-              <a:t> of a panel of experts about a particular scientific, medical, nursing, or administrative issue. Its purpose is </a:t>
+              <a:t> of a panel of experts… </a:t>
             </a:r>
             <a:r>
               <a:rPr b="1" i="1" lang="en-US" sz="3100">
@@ -13347,7 +13370,7 @@
         <p:spPr>
           <a:xfrm>
             <a:off x="8637600" y="5467499"/>
-            <a:ext cx="7848600" cy="13114200"/>
+            <a:ext cx="7848600" cy="7911600"/>
           </a:xfrm>
           <a:prstGeom prst="rect">
             <a:avLst/>
@@ -13750,7 +13773,7 @@
               <a:buAutoNum type="arabicPeriod"/>
             </a:pPr>
             <a:r>
-              <a:rPr lang="en-US" sz="3100">
+              <a:rPr b="1" lang="en-US" sz="3100">
                 <a:solidFill>
                   <a:schemeClr val="dk1"/>
                 </a:solidFill>
@@ -13759,88 +13782,8 @@
                 <a:cs typeface="Calibri"/>
                 <a:sym typeface="Calibri"/>
               </a:rPr>
-              <a:t>Expert consensus reached to provide recommendations for clinical indications </a:t>
+              <a:t>Expert consensus reached </a:t>
             </a:r>
-            <a:endParaRPr sz="3100">
-              <a:solidFill>
-                <a:schemeClr val="dk1"/>
-              </a:solidFill>
-              <a:latin typeface="Calibri"/>
-              <a:ea typeface="Calibri"/>
-              <a:cs typeface="Calibri"/>
-              <a:sym typeface="Calibri"/>
-            </a:endParaRPr>
-          </a:p>
-          <a:p>
-            <a:pPr indent="0" lvl="0" marL="457200" marR="0" rtl="0" algn="l">
-              <a:spcBef>
-                <a:spcPts val="0"/>
-              </a:spcBef>
-              <a:spcAft>
-                <a:spcPts val="0"/>
-              </a:spcAft>
-              <a:buNone/>
-            </a:pPr>
-            <a:r>
-              <a:t/>
-            </a:r>
-            <a:endParaRPr b="1">
-              <a:solidFill>
-                <a:schemeClr val="dk1"/>
-              </a:solidFill>
-              <a:latin typeface="Calibri"/>
-              <a:ea typeface="Calibri"/>
-              <a:cs typeface="Calibri"/>
-              <a:sym typeface="Calibri"/>
-            </a:endParaRPr>
-          </a:p>
-          <a:p>
-            <a:pPr indent="0" lvl="0" marL="0" rtl="0" algn="l">
-              <a:spcBef>
-                <a:spcPts val="0"/>
-              </a:spcBef>
-              <a:spcAft>
-                <a:spcPts val="0"/>
-              </a:spcAft>
-              <a:buNone/>
-            </a:pPr>
-            <a:r>
-              <a:rPr b="1" lang="en-US" sz="3100" u="sng">
-                <a:solidFill>
-                  <a:schemeClr val="dk1"/>
-                </a:solidFill>
-                <a:latin typeface="Calibri"/>
-                <a:ea typeface="Calibri"/>
-                <a:cs typeface="Calibri"/>
-                <a:sym typeface="Calibri"/>
-              </a:rPr>
-              <a:t>RAND/UCLA Benefits:</a:t>
-            </a:r>
-            <a:endParaRPr b="1" sz="3100" u="sng">
-              <a:solidFill>
-                <a:schemeClr val="dk1"/>
-              </a:solidFill>
-              <a:latin typeface="Calibri"/>
-              <a:ea typeface="Calibri"/>
-              <a:cs typeface="Calibri"/>
-              <a:sym typeface="Calibri"/>
-            </a:endParaRPr>
-          </a:p>
-          <a:p>
-            <a:pPr indent="-425450" lvl="0" marL="457200" rtl="0" algn="l">
-              <a:spcBef>
-                <a:spcPts val="0"/>
-              </a:spcBef>
-              <a:spcAft>
-                <a:spcPts val="0"/>
-              </a:spcAft>
-              <a:buClr>
-                <a:schemeClr val="dk1"/>
-              </a:buClr>
-              <a:buSzPts val="3100"/>
-              <a:buFont typeface="Calibri"/>
-              <a:buChar char="●"/>
-            </a:pPr>
             <a:r>
               <a:rPr lang="en-US" sz="3100">
                 <a:solidFill>
@@ -13851,210 +13794,7 @@
                 <a:cs typeface="Calibri"/>
                 <a:sym typeface="Calibri"/>
               </a:rPr>
-              <a:t>Uses positive aspects of both the Delphi and Nominal Group approaches</a:t>
-            </a:r>
-            <a:endParaRPr sz="3100">
-              <a:solidFill>
-                <a:schemeClr val="dk1"/>
-              </a:solidFill>
-              <a:latin typeface="Calibri"/>
-              <a:ea typeface="Calibri"/>
-              <a:cs typeface="Calibri"/>
-              <a:sym typeface="Calibri"/>
-            </a:endParaRPr>
-          </a:p>
-          <a:p>
-            <a:pPr indent="-425450" lvl="0" marL="457200" rtl="0" algn="l">
-              <a:spcBef>
-                <a:spcPts val="0"/>
-              </a:spcBef>
-              <a:spcAft>
-                <a:spcPts val="0"/>
-              </a:spcAft>
-              <a:buClr>
-                <a:schemeClr val="dk1"/>
-              </a:buClr>
-              <a:buSzPts val="3100"/>
-              <a:buFont typeface="Calibri"/>
-              <a:buChar char="●"/>
-            </a:pPr>
-            <a:r>
-              <a:rPr lang="en-US" sz="3100">
-                <a:solidFill>
-                  <a:schemeClr val="dk1"/>
-                </a:solidFill>
-                <a:latin typeface="Calibri"/>
-                <a:ea typeface="Calibri"/>
-                <a:cs typeface="Calibri"/>
-                <a:sym typeface="Calibri"/>
-              </a:rPr>
-              <a:t>Values expert collaboration and discussion of complex topics from varying perspectives</a:t>
-            </a:r>
-            <a:endParaRPr sz="3100">
-              <a:solidFill>
-                <a:schemeClr val="dk1"/>
-              </a:solidFill>
-              <a:latin typeface="Calibri"/>
-              <a:ea typeface="Calibri"/>
-              <a:cs typeface="Calibri"/>
-              <a:sym typeface="Calibri"/>
-            </a:endParaRPr>
-          </a:p>
-          <a:p>
-            <a:pPr indent="-425450" lvl="0" marL="457200" rtl="0" algn="l">
-              <a:spcBef>
-                <a:spcPts val="0"/>
-              </a:spcBef>
-              <a:spcAft>
-                <a:spcPts val="0"/>
-              </a:spcAft>
-              <a:buClr>
-                <a:schemeClr val="dk1"/>
-              </a:buClr>
-              <a:buSzPts val="3100"/>
-              <a:buFont typeface="Calibri"/>
-              <a:buChar char="●"/>
-            </a:pPr>
-            <a:r>
-              <a:rPr lang="en-US" sz="3100">
-                <a:solidFill>
-                  <a:schemeClr val="dk1"/>
-                </a:solidFill>
-                <a:latin typeface="Calibri"/>
-                <a:ea typeface="Calibri"/>
-                <a:cs typeface="Calibri"/>
-                <a:sym typeface="Calibri"/>
-              </a:rPr>
-              <a:t>Increasingly feasible through virtual means</a:t>
-            </a:r>
-            <a:endParaRPr sz="3100">
-              <a:solidFill>
-                <a:schemeClr val="dk1"/>
-              </a:solidFill>
-              <a:latin typeface="Calibri"/>
-              <a:ea typeface="Calibri"/>
-              <a:cs typeface="Calibri"/>
-              <a:sym typeface="Calibri"/>
-            </a:endParaRPr>
-          </a:p>
-          <a:p>
-            <a:pPr indent="0" lvl="0" marL="457200" rtl="0" algn="l">
-              <a:spcBef>
-                <a:spcPts val="0"/>
-              </a:spcBef>
-              <a:spcAft>
-                <a:spcPts val="0"/>
-              </a:spcAft>
-              <a:buNone/>
-            </a:pPr>
-            <a:r>
-              <a:t/>
-            </a:r>
-            <a:endParaRPr>
-              <a:solidFill>
-                <a:schemeClr val="dk1"/>
-              </a:solidFill>
-              <a:latin typeface="Calibri"/>
-              <a:ea typeface="Calibri"/>
-              <a:cs typeface="Calibri"/>
-              <a:sym typeface="Calibri"/>
-            </a:endParaRPr>
-          </a:p>
-          <a:p>
-            <a:pPr indent="0" lvl="0" marL="0" rtl="0" algn="l">
-              <a:spcBef>
-                <a:spcPts val="0"/>
-              </a:spcBef>
-              <a:spcAft>
-                <a:spcPts val="0"/>
-              </a:spcAft>
-              <a:buNone/>
-            </a:pPr>
-            <a:r>
-              <a:rPr b="1" lang="en-US" sz="3100" u="sng">
-                <a:solidFill>
-                  <a:schemeClr val="dk1"/>
-                </a:solidFill>
-                <a:latin typeface="Calibri"/>
-                <a:ea typeface="Calibri"/>
-                <a:cs typeface="Calibri"/>
-                <a:sym typeface="Calibri"/>
-              </a:rPr>
-              <a:t>RAND/UCLA Limitations:</a:t>
-            </a:r>
-            <a:endParaRPr b="1" sz="3100" u="sng">
-              <a:solidFill>
-                <a:schemeClr val="dk1"/>
-              </a:solidFill>
-              <a:latin typeface="Calibri"/>
-              <a:ea typeface="Calibri"/>
-              <a:cs typeface="Calibri"/>
-              <a:sym typeface="Calibri"/>
-            </a:endParaRPr>
-          </a:p>
-          <a:p>
-            <a:pPr indent="-425450" lvl="0" marL="457200" rtl="0" algn="l">
-              <a:spcBef>
-                <a:spcPts val="0"/>
-              </a:spcBef>
-              <a:spcAft>
-                <a:spcPts val="0"/>
-              </a:spcAft>
-              <a:buClr>
-                <a:schemeClr val="dk1"/>
-              </a:buClr>
-              <a:buSzPts val="3100"/>
-              <a:buFont typeface="Calibri"/>
-              <a:buChar char="●"/>
-            </a:pPr>
-            <a:r>
-              <a:rPr lang="en-US" sz="3100">
-                <a:solidFill>
-                  <a:schemeClr val="dk1"/>
-                </a:solidFill>
-                <a:latin typeface="Calibri"/>
-                <a:ea typeface="Calibri"/>
-                <a:cs typeface="Calibri"/>
-                <a:sym typeface="Calibri"/>
-              </a:rPr>
-              <a:t>Groupthink and peer pressure; ratings trend toward the mode</a:t>
-            </a:r>
-            <a:endParaRPr sz="3100">
-              <a:solidFill>
-                <a:schemeClr val="dk1"/>
-              </a:solidFill>
-              <a:latin typeface="Calibri"/>
-              <a:ea typeface="Calibri"/>
-              <a:cs typeface="Calibri"/>
-              <a:sym typeface="Calibri"/>
-            </a:endParaRPr>
-          </a:p>
-          <a:p>
-            <a:pPr indent="-425450" lvl="0" marL="457200" rtl="0" algn="l">
-              <a:spcBef>
-                <a:spcPts val="0"/>
-              </a:spcBef>
-              <a:spcAft>
-                <a:spcPts val="0"/>
-              </a:spcAft>
-              <a:buClr>
-                <a:schemeClr val="dk1"/>
-              </a:buClr>
-              <a:buSzPts val="3100"/>
-              <a:buFont typeface="Calibri"/>
-              <a:buChar char="●"/>
-            </a:pPr>
-            <a:r>
-              <a:rPr lang="en-US" sz="3100">
-                <a:solidFill>
-                  <a:schemeClr val="dk1"/>
-                </a:solidFill>
-                <a:latin typeface="Calibri"/>
-                <a:ea typeface="Calibri"/>
-                <a:cs typeface="Calibri"/>
-                <a:sym typeface="Calibri"/>
-              </a:rPr>
-              <a:t>Logistical issues for expert assembly </a:t>
+              <a:t>to provide recommendations for clinical indications </a:t>
             </a:r>
             <a:endParaRPr sz="3100">
               <a:solidFill>
@@ -15617,7 +15357,7 @@
               <a:r>
                 <a:rPr b="1" lang="en-US" sz="4800" u="sng">
                   <a:solidFill>
-                    <a:schemeClr val="lt2"/>
+                    <a:schemeClr val="dk1"/>
                   </a:solidFill>
                   <a:latin typeface="Calibri"/>
                   <a:ea typeface="Calibri"/>
@@ -15628,7 +15368,7 @@
               </a:r>
               <a:endParaRPr b="1" sz="3400" u="sng">
                 <a:solidFill>
-                  <a:schemeClr val="lt2"/>
+                  <a:schemeClr val="dk1"/>
                 </a:solidFill>
               </a:endParaRPr>
             </a:p>
@@ -16472,6 +16212,114 @@
           </a:ln>
         </p:spPr>
       </p:pic>
+      <p:pic>
+        <p:nvPicPr>
+          <p:cNvPr id="123" name="Google Shape;123;p1"/>
+          <p:cNvPicPr preferRelativeResize="0"/>
+          <p:nvPr/>
+        </p:nvPicPr>
+        <p:blipFill rotWithShape="1">
+          <a:blip r:embed="rId7">
+            <a:alphaModFix/>
+          </a:blip>
+          <a:srcRect b="0" l="0" r="53669" t="0"/>
+          <a:stretch/>
+        </p:blipFill>
+        <p:spPr>
+          <a:xfrm>
+            <a:off x="8715450" y="12436700"/>
+            <a:ext cx="3706974" cy="5646026"/>
+          </a:xfrm>
+          <a:prstGeom prst="rect">
+            <a:avLst/>
+          </a:prstGeom>
+          <a:noFill/>
+          <a:ln>
+            <a:noFill/>
+          </a:ln>
+        </p:spPr>
+      </p:pic>
+      <p:pic>
+        <p:nvPicPr>
+          <p:cNvPr id="124" name="Google Shape;124;p1"/>
+          <p:cNvPicPr preferRelativeResize="0"/>
+          <p:nvPr/>
+        </p:nvPicPr>
+        <p:blipFill rotWithShape="1">
+          <a:blip r:embed="rId7">
+            <a:alphaModFix/>
+          </a:blip>
+          <a:srcRect b="0" l="58118" r="0" t="0"/>
+          <a:stretch/>
+        </p:blipFill>
+        <p:spPr>
+          <a:xfrm>
+            <a:off x="12422425" y="12436700"/>
+            <a:ext cx="3350975" cy="5646026"/>
+          </a:xfrm>
+          <a:prstGeom prst="rect">
+            <a:avLst/>
+          </a:prstGeom>
+          <a:noFill/>
+          <a:ln>
+            <a:noFill/>
+          </a:ln>
+        </p:spPr>
+      </p:pic>
+      <p:sp>
+        <p:nvSpPr>
+          <p:cNvPr id="125" name="Google Shape;125;p1"/>
+          <p:cNvSpPr/>
+          <p:nvPr/>
+        </p:nvSpPr>
+        <p:spPr>
+          <a:xfrm>
+            <a:off x="12334800" y="15162250"/>
+            <a:ext cx="430500" cy="590700"/>
+          </a:xfrm>
+          <a:prstGeom prst="rect">
+            <a:avLst/>
+          </a:prstGeom>
+          <a:solidFill>
+            <a:srgbClr val="FFFFFF"/>
+          </a:solidFill>
+          <a:ln cap="flat" cmpd="sng" w="9525">
+            <a:solidFill>
+              <a:schemeClr val="lt1"/>
+            </a:solidFill>
+            <a:prstDash val="solid"/>
+            <a:round/>
+            <a:headEnd len="sm" w="sm" type="none"/>
+            <a:tailEnd len="sm" w="sm" type="none"/>
+          </a:ln>
+        </p:spPr>
+        <p:txBody>
+          <a:bodyPr anchorCtr="0" anchor="ctr" bIns="91425" lIns="91425" spcFirstLastPara="1" rIns="91425" wrap="square" tIns="91425">
+            <a:noAutofit/>
+          </a:bodyPr>
+          <a:lstStyle/>
+          <a:p>
+            <a:pPr indent="0" lvl="0" marL="0" rtl="0" algn="ctr">
+              <a:spcBef>
+                <a:spcPts val="0"/>
+              </a:spcBef>
+              <a:spcAft>
+                <a:spcPts val="0"/>
+              </a:spcAft>
+              <a:buNone/>
+            </a:pPr>
+            <a:r>
+              <a:t/>
+            </a:r>
+            <a:endParaRPr>
+              <a:latin typeface="Calibri"/>
+              <a:ea typeface="Calibri"/>
+              <a:cs typeface="Calibri"/>
+              <a:sym typeface="Calibri"/>
+            </a:endParaRPr>
+          </a:p>
+        </p:txBody>
+      </p:sp>
     </p:spTree>
   </p:cSld>
   <p:clrMapOvr>

</xml_diff>